<commit_message>
Adicionado modificações no PI
</commit_message>
<xml_diff>
--- a/PI/ApresentacaoSaneaSP.pptx
+++ b/PI/ApresentacaoSaneaSP.pptx
@@ -236,7 +236,7 @@
             <a:fld id="{957E3F99-D12F-4954-A61D-F49FB68D10A3}" type="datetimeFigureOut">
               <a:rPr lang="pt-BR" smtClean="0"/>
               <a:pPr/>
-              <a:t>29/11/2024</a:t>
+              <a:t>04/12/2024</a:t>
             </a:fld>
             <a:endParaRPr lang="pt-BR"/>
           </a:p>
@@ -403,7 +403,7 @@
           <a:p>
             <a:fld id="{9EAB1CE6-8F3D-4AFD-A409-3AD4E3F5533B}" type="datetimeFigureOut">
               <a:rPr lang="pt-BR" smtClean="0"/>
-              <a:t>29/11/2024</a:t>
+              <a:t>04/12/2024</a:t>
             </a:fld>
             <a:endParaRPr lang="pt-BR"/>
           </a:p>
@@ -830,7 +830,7 @@
           <a:p>
             <a:fld id="{3D5CD8D2-619D-4402-946F-26D241F5F5CC}" type="datetime1">
               <a:rPr lang="pt-BR" smtClean="0"/>
-              <a:t>29/11/2024</a:t>
+              <a:t>04/12/2024</a:t>
             </a:fld>
             <a:endParaRPr lang="pt-BR"/>
           </a:p>
@@ -1147,7 +1147,7 @@
           <a:p>
             <a:fld id="{1A43C5A2-FA6F-4595-92BC-2DACE1A39B61}" type="datetime1">
               <a:rPr lang="pt-BR" smtClean="0"/>
-              <a:t>29/11/2024</a:t>
+              <a:t>04/12/2024</a:t>
             </a:fld>
             <a:endParaRPr lang="pt-BR"/>
           </a:p>
@@ -2813,7 +2813,7 @@
         <p:spPr>
           <a:xfrm>
             <a:off x="4565175" y="4155229"/>
-            <a:ext cx="4578824" cy="1554272"/>
+            <a:ext cx="4578824" cy="1477328"/>
           </a:xfrm>
           <a:prstGeom prst="rect">
             <a:avLst/>
@@ -2886,12 +2886,22 @@
             </a:r>
           </a:p>
           <a:p>
-            <a:pPr algn="ctr">
-              <a:spcBef>
-                <a:spcPts val="600"/>
-              </a:spcBef>
-            </a:pPr>
-            <a:endParaRPr lang="pt-BR" sz="1800" b="1" dirty="0"/>
+            <a:r>
+              <a:rPr lang="pt-BR" dirty="0"/>
+              <a:t>	</a:t>
+            </a:r>
+            <a:r>
+              <a:rPr lang="pt-BR" dirty="0" err="1"/>
+              <a:t>Prof</a:t>
+            </a:r>
+            <a:r>
+              <a:rPr lang="pt-BR" baseline="30000" dirty="0" err="1"/>
+              <a:t>a</a:t>
+            </a:r>
+            <a:r>
+              <a:rPr lang="pt-BR" dirty="0"/>
+              <a:t> Maria Janaina da Silva Ferreira </a:t>
+            </a:r>
           </a:p>
         </p:txBody>
       </p:sp>
@@ -3700,6 +3710,109 @@
                       </p:childTnLst>
                     </p:cTn>
                   </p:par>
+                  <p:par>
+                    <p:cTn id="48" fill="hold">
+                      <p:stCondLst>
+                        <p:cond delay="indefinite"/>
+                      </p:stCondLst>
+                      <p:childTnLst>
+                        <p:par>
+                          <p:cTn id="49" fill="hold">
+                            <p:stCondLst>
+                              <p:cond delay="0"/>
+                            </p:stCondLst>
+                            <p:childTnLst>
+                              <p:par>
+                                <p:cTn id="50" presetID="2" presetClass="entr" presetSubtype="4" fill="hold" nodeType="clickEffect">
+                                  <p:stCondLst>
+                                    <p:cond delay="0"/>
+                                  </p:stCondLst>
+                                  <p:childTnLst>
+                                    <p:set>
+                                      <p:cBhvr>
+                                        <p:cTn id="51" dur="1" fill="hold">
+                                          <p:stCondLst>
+                                            <p:cond delay="0"/>
+                                          </p:stCondLst>
+                                        </p:cTn>
+                                        <p:tgtEl>
+                                          <p:spTgt spid="4">
+                                            <p:txEl>
+                                              <p:pRg st="4" end="4"/>
+                                            </p:txEl>
+                                          </p:spTgt>
+                                        </p:tgtEl>
+                                        <p:attrNameLst>
+                                          <p:attrName>style.visibility</p:attrName>
+                                        </p:attrNameLst>
+                                      </p:cBhvr>
+                                      <p:to>
+                                        <p:strVal val="visible"/>
+                                      </p:to>
+                                    </p:set>
+                                    <p:anim calcmode="lin" valueType="num">
+                                      <p:cBhvr additive="base">
+                                        <p:cTn id="52" dur="500" fill="hold"/>
+                                        <p:tgtEl>
+                                          <p:spTgt spid="4">
+                                            <p:txEl>
+                                              <p:pRg st="4" end="4"/>
+                                            </p:txEl>
+                                          </p:spTgt>
+                                        </p:tgtEl>
+                                        <p:attrNameLst>
+                                          <p:attrName>ppt_x</p:attrName>
+                                        </p:attrNameLst>
+                                      </p:cBhvr>
+                                      <p:tavLst>
+                                        <p:tav tm="0">
+                                          <p:val>
+                                            <p:strVal val="#ppt_x"/>
+                                          </p:val>
+                                        </p:tav>
+                                        <p:tav tm="100000">
+                                          <p:val>
+                                            <p:strVal val="#ppt_x"/>
+                                          </p:val>
+                                        </p:tav>
+                                      </p:tavLst>
+                                    </p:anim>
+                                    <p:anim calcmode="lin" valueType="num">
+                                      <p:cBhvr additive="base">
+                                        <p:cTn id="53" dur="500" fill="hold"/>
+                                        <p:tgtEl>
+                                          <p:spTgt spid="4">
+                                            <p:txEl>
+                                              <p:pRg st="4" end="4"/>
+                                            </p:txEl>
+                                          </p:spTgt>
+                                        </p:tgtEl>
+                                        <p:attrNameLst>
+                                          <p:attrName>ppt_y</p:attrName>
+                                        </p:attrNameLst>
+                                      </p:cBhvr>
+                                      <p:tavLst>
+                                        <p:tav tm="0">
+                                          <p:val>
+                                            <p:strVal val="1+#ppt_h/2"/>
+                                          </p:val>
+                                        </p:tav>
+                                        <p:tav tm="100000">
+                                          <p:val>
+                                            <p:strVal val="#ppt_y"/>
+                                          </p:val>
+                                        </p:tav>
+                                      </p:tavLst>
+                                    </p:anim>
+                                  </p:childTnLst>
+                                </p:cTn>
+                              </p:par>
+                            </p:childTnLst>
+                          </p:cTn>
+                        </p:par>
+                      </p:childTnLst>
+                    </p:cTn>
+                  </p:par>
                 </p:childTnLst>
               </p:cTn>
               <p:prevCondLst>
@@ -4676,7 +4789,7 @@
               <a:rPr lang="pt-BR" sz="2800" dirty="0">
                 <a:latin typeface="Oswald" panose="00000500000000000000" pitchFamily="2" charset="0"/>
               </a:rPr>
-              <a:t>	Nosso objetivo é melhorar a qualidade dos serviços de saneamento em São Paulo, garantindo o cumprimento dos Objetivos de Desenvolvimento Sustentável (ODS) 6, 3 e 14.</a:t>
+              <a:t>	Nosso objetivo é melhorar a qualidade dos serviços de saneamento em São Paulo, garantindo o cumprimento dos Objetivos de Desenvolvimento Sustentável (ODS) 3 e 6</a:t>
             </a:r>
             <a:endParaRPr lang="pt-BR" sz="2800" dirty="0">
               <a:latin typeface="Oswald" panose="00000500000000000000" pitchFamily="2" charset="0"/>
@@ -5066,10 +5179,10 @@
       </p:sp>
       <p:pic>
         <p:nvPicPr>
-          <p:cNvPr id="7" name="Espaço Reservado para Conteúdo 6">
+          <p:cNvPr id="6" name="Espaço Reservado para Conteúdo 5">
             <a:extLst>
               <a:ext uri="{FF2B5EF4-FFF2-40B4-BE49-F238E27FC236}">
-                <a16:creationId xmlns:a16="http://schemas.microsoft.com/office/drawing/2014/main" id="{E828F0F5-A761-A6A0-8AB4-C67C6975CACE}"/>
+                <a16:creationId xmlns:a16="http://schemas.microsoft.com/office/drawing/2014/main" id="{6F2537AC-6183-239E-E5C0-DD1F3AE65C33}"/>
               </a:ext>
             </a:extLst>
           </p:cNvPr>

</xml_diff>